<commit_message>
Added documentation and testing
updated project proposal document and added a new testing document.
</commit_message>
<xml_diff>
--- a/Documentation/Proposal/3D Metal Printing Presentation.pptx
+++ b/Documentation/Proposal/3D Metal Printing Presentation.pptx
@@ -339,7 +339,7 @@
           <a:p>
             <a:fld id="{B610EA78-202F-4A0D-9AE5-CA2F6341E61A}" type="datetimeFigureOut">
               <a:rPr lang="en-US" smtClean="0"/>
-              <a:t>1/30/2015</a:t>
+              <a:t>2/9/15</a:t>
             </a:fld>
             <a:endParaRPr lang="en-US"/>
           </a:p>
@@ -547,7 +547,7 @@
           <a:p>
             <a:fld id="{B610EA78-202F-4A0D-9AE5-CA2F6341E61A}" type="datetimeFigureOut">
               <a:rPr lang="en-US" smtClean="0"/>
-              <a:t>1/30/2015</a:t>
+              <a:t>2/9/15</a:t>
             </a:fld>
             <a:endParaRPr lang="en-US"/>
           </a:p>
@@ -803,7 +803,7 @@
           <a:p>
             <a:fld id="{B610EA78-202F-4A0D-9AE5-CA2F6341E61A}" type="datetimeFigureOut">
               <a:rPr lang="en-US" smtClean="0"/>
-              <a:t>1/30/2015</a:t>
+              <a:t>2/9/15</a:t>
             </a:fld>
             <a:endParaRPr lang="en-US"/>
           </a:p>
@@ -977,7 +977,7 @@
           <a:p>
             <a:fld id="{B610EA78-202F-4A0D-9AE5-CA2F6341E61A}" type="datetimeFigureOut">
               <a:rPr lang="en-US" smtClean="0"/>
-              <a:t>1/30/2015</a:t>
+              <a:t>2/9/15</a:t>
             </a:fld>
             <a:endParaRPr lang="en-US"/>
           </a:p>
@@ -1320,7 +1320,7 @@
           <a:p>
             <a:fld id="{B610EA78-202F-4A0D-9AE5-CA2F6341E61A}" type="datetimeFigureOut">
               <a:rPr lang="en-US" smtClean="0"/>
-              <a:t>1/30/2015</a:t>
+              <a:t>2/9/15</a:t>
             </a:fld>
             <a:endParaRPr lang="en-US"/>
           </a:p>
@@ -1595,7 +1595,7 @@
           <a:p>
             <a:fld id="{B610EA78-202F-4A0D-9AE5-CA2F6341E61A}" type="datetimeFigureOut">
               <a:rPr lang="en-US" smtClean="0"/>
-              <a:t>1/30/2015</a:t>
+              <a:t>2/9/15</a:t>
             </a:fld>
             <a:endParaRPr lang="en-US"/>
           </a:p>
@@ -1974,7 +1974,7 @@
           <a:p>
             <a:fld id="{B610EA78-202F-4A0D-9AE5-CA2F6341E61A}" type="datetimeFigureOut">
               <a:rPr lang="en-US" smtClean="0"/>
-              <a:t>1/30/2015</a:t>
+              <a:t>2/9/15</a:t>
             </a:fld>
             <a:endParaRPr lang="en-US"/>
           </a:p>
@@ -2092,7 +2092,7 @@
           <a:p>
             <a:fld id="{B610EA78-202F-4A0D-9AE5-CA2F6341E61A}" type="datetimeFigureOut">
               <a:rPr lang="en-US" smtClean="0"/>
-              <a:t>1/30/2015</a:t>
+              <a:t>2/9/15</a:t>
             </a:fld>
             <a:endParaRPr lang="en-US"/>
           </a:p>
@@ -2263,7 +2263,7 @@
           <a:p>
             <a:fld id="{B610EA78-202F-4A0D-9AE5-CA2F6341E61A}" type="datetimeFigureOut">
               <a:rPr lang="en-US" smtClean="0"/>
-              <a:t>1/30/2015</a:t>
+              <a:t>2/9/15</a:t>
             </a:fld>
             <a:endParaRPr lang="en-US"/>
           </a:p>
@@ -2617,7 +2617,7 @@
           <a:p>
             <a:fld id="{B610EA78-202F-4A0D-9AE5-CA2F6341E61A}" type="datetimeFigureOut">
               <a:rPr lang="en-US" smtClean="0"/>
-              <a:t>1/30/2015</a:t>
+              <a:t>2/9/15</a:t>
             </a:fld>
             <a:endParaRPr lang="en-US"/>
           </a:p>
@@ -2996,7 +2996,7 @@
           <a:p>
             <a:fld id="{B610EA78-202F-4A0D-9AE5-CA2F6341E61A}" type="datetimeFigureOut">
               <a:rPr lang="en-US" smtClean="0"/>
-              <a:t>1/30/2015</a:t>
+              <a:t>2/9/15</a:t>
             </a:fld>
             <a:endParaRPr lang="en-US"/>
           </a:p>
@@ -3283,7 +3283,7 @@
           <a:p>
             <a:fld id="{B610EA78-202F-4A0D-9AE5-CA2F6341E61A}" type="datetimeFigureOut">
               <a:rPr lang="en-US" smtClean="0"/>
-              <a:t>1/30/2015</a:t>
+              <a:t>2/9/15</a:t>
             </a:fld>
             <a:endParaRPr lang="en-US"/>
           </a:p>
@@ -4126,8 +4126,23 @@
             </a:pPr>
             <a:r>
               <a:rPr lang="en-US" dirty="0" smtClean="0"/>
-              <a:t>And must control when material is being deposited</a:t>
-            </a:r>
+              <a:t>And must control when material is being </a:t>
+            </a:r>
+            <a:r>
+              <a:rPr lang="en-US" dirty="0" smtClean="0"/>
+              <a:t>deposited</a:t>
+            </a:r>
+          </a:p>
+          <a:p>
+            <a:pPr>
+              <a:buFont typeface="Arial" panose="020B0604020202020204" pitchFamily="34" charset="0"/>
+              <a:buChar char="•"/>
+            </a:pPr>
+            <a:r>
+              <a:rPr lang="en-US" dirty="0" smtClean="0"/>
+              <a:t>Must </a:t>
+            </a:r>
+            <a:endParaRPr lang="en-US" dirty="0" smtClean="0"/>
           </a:p>
           <a:p>
             <a:pPr marL="201168" lvl="1" indent="0">
@@ -4169,17 +4184,6 @@
             <a:r>
               <a:rPr lang="en-US" dirty="0" smtClean="0"/>
               <a:t>May show amount of wire left on spool</a:t>
-            </a:r>
-            <a:endParaRPr lang="en-US" dirty="0" smtClean="0"/>
-          </a:p>
-          <a:p>
-            <a:pPr>
-              <a:buFont typeface="Arial" panose="020B0604020202020204" pitchFamily="34" charset="0"/>
-              <a:buChar char="•"/>
-            </a:pPr>
-            <a:r>
-              <a:rPr lang="en-US" dirty="0" smtClean="0"/>
-              <a:t>May display estimated finish time</a:t>
             </a:r>
           </a:p>
           <a:p>
@@ -7327,7 +7331,7 @@
     </a:clrScheme>
     <a:fontScheme name="Retrospect">
       <a:majorFont>
-        <a:latin typeface="Calibri Light" panose="020F0302020204030204"/>
+        <a:latin typeface="Calibri Light"/>
         <a:ea typeface=""/>
         <a:cs typeface=""/>
         <a:font script="Jpan" typeface="ＭＳ Ｐゴシック"/>
@@ -7362,7 +7366,7 @@
         <a:font script="Geor" typeface="Sylfaen"/>
       </a:majorFont>
       <a:minorFont>
-        <a:latin typeface="Calibri" panose="020F0502020204030204"/>
+        <a:latin typeface="Calibri"/>
         <a:ea typeface=""/>
         <a:cs typeface=""/>
         <a:font script="Jpan" typeface="ＭＳ Ｐゴシック"/>
@@ -7561,7 +7565,7 @@
   <a:extraClrSchemeLst/>
   <a:extLst>
     <a:ext uri="{05A4C25C-085E-4340-85A3-A5531E510DB2}">
-      <thm15:themeFamily xmlns:thm15="http://schemas.microsoft.com/office/thememl/2012/main" xmlns="" name="Retrospect" id="{5F128B03-DCCA-4EEB-AB3B-CF2899314A46}" vid="{3F1AAB62-24C6-49D2-8E01-B56FAC9A3DCD}"/>
+      <thm15:themeFamily xmlns="" xmlns:thm15="http://schemas.microsoft.com/office/thememl/2012/main" name="Retrospect" id="{5F128B03-DCCA-4EEB-AB3B-CF2899314A46}" vid="{3F1AAB62-24C6-49D2-8E01-B56FAC9A3DCD}"/>
     </a:ext>
   </a:extLst>
 </a:theme>

</xml_diff>